<commit_message>
adding final, pre-flight version of powerpoint poster
</commit_message>
<xml_diff>
--- a/posters/2010_icml/forgettingCounts/ForgettingCountsPoster.pptx
+++ b/posters/2010_icml/forgettingCounts/ForgettingCountsPoster.pptx
@@ -4051,7 +4051,7 @@
         </mc:AlternateContent>
         <p:spPr>
           <a:xfrm>
-            <a:off x="13196094" y="19431724"/>
+            <a:off x="12929396" y="18691353"/>
             <a:ext cx="7848600" cy="8679473"/>
           </a:xfrm>
           <a:prstGeom prst="rect">
@@ -4092,7 +4092,7 @@
         </mc:AlternateContent>
         <p:spPr>
           <a:xfrm>
-            <a:off x="21578093" y="19431724"/>
+            <a:off x="21311393" y="18691353"/>
             <a:ext cx="7848600" cy="5411221"/>
           </a:xfrm>
           <a:prstGeom prst="rect">
@@ -4133,8 +4133,8 @@
         </mc:AlternateContent>
         <p:spPr>
           <a:xfrm>
-            <a:off x="13196094" y="3789397"/>
-            <a:ext cx="16230600" cy="3526292"/>
+            <a:off x="12929394" y="13759703"/>
+            <a:ext cx="16230600" cy="3526291"/>
           </a:xfrm>
           <a:prstGeom prst="rect">
             <a:avLst/>
@@ -4181,7 +4181,7 @@
         </mc:AlternateContent>
         <p:spPr>
           <a:xfrm>
-            <a:off x="30984134" y="3789398"/>
+            <a:off x="30760194" y="7288867"/>
             <a:ext cx="10629939" cy="11238113"/>
           </a:xfrm>
           <a:prstGeom prst="rect">
@@ -4267,7 +4267,7 @@
         </mc:AlternateContent>
         <p:spPr>
           <a:xfrm>
-            <a:off x="13196094" y="11804759"/>
+            <a:off x="12929394" y="6145867"/>
             <a:ext cx="16230600" cy="4523461"/>
           </a:xfrm>
           <a:prstGeom prst="rect">
@@ -4286,7 +4286,7 @@
         </p:nvSpPr>
         <p:spPr>
           <a:xfrm>
-            <a:off x="13196094" y="3081513"/>
+            <a:off x="12929396" y="13051818"/>
             <a:ext cx="16230600" cy="707885"/>
           </a:xfrm>
           <a:prstGeom prst="rect">
@@ -4549,7 +4549,7 @@
         </p:nvSpPr>
         <p:spPr>
           <a:xfrm>
-            <a:off x="13196094" y="11096873"/>
+            <a:off x="12929394" y="5437981"/>
             <a:ext cx="16230600" cy="707886"/>
           </a:xfrm>
           <a:prstGeom prst="rect">
@@ -4711,7 +4711,7 @@
         </p:nvSpPr>
         <p:spPr>
           <a:xfrm>
-            <a:off x="13196094" y="16328220"/>
+            <a:off x="12929394" y="10690017"/>
             <a:ext cx="16230600" cy="1708160"/>
           </a:xfrm>
           <a:prstGeom prst="rect">
@@ -4751,7 +4751,7 @@
         </p:nvSpPr>
         <p:spPr>
           <a:xfrm>
-            <a:off x="30984134" y="3081512"/>
+            <a:off x="30760194" y="6580981"/>
             <a:ext cx="10629939" cy="707886"/>
           </a:xfrm>
           <a:prstGeom prst="rect">
@@ -4791,7 +4791,7 @@
         </p:nvSpPr>
         <p:spPr>
           <a:xfrm>
-            <a:off x="13196094" y="8311495"/>
+            <a:off x="12929394" y="3081511"/>
             <a:ext cx="16230600" cy="707886"/>
           </a:xfrm>
           <a:prstGeom prst="rect">
@@ -4852,7 +4852,7 @@
         </p:nvSpPr>
         <p:spPr>
           <a:xfrm>
-            <a:off x="13196094" y="9012892"/>
+            <a:off x="12929394" y="3789397"/>
             <a:ext cx="16230600" cy="1169551"/>
           </a:xfrm>
           <a:prstGeom prst="rect">
@@ -4884,7 +4884,7 @@
         </p:nvSpPr>
         <p:spPr>
           <a:xfrm>
-            <a:off x="21578093" y="18753649"/>
+            <a:off x="21311393" y="17983467"/>
             <a:ext cx="7848601" cy="707886"/>
           </a:xfrm>
           <a:prstGeom prst="rect">
@@ -4924,7 +4924,7 @@
         </p:nvSpPr>
         <p:spPr>
           <a:xfrm>
-            <a:off x="13196094" y="18753649"/>
+            <a:off x="12929396" y="17983467"/>
             <a:ext cx="7848600" cy="707886"/>
           </a:xfrm>
           <a:prstGeom prst="rect">
@@ -4952,6 +4952,90 @@
                 </a:solidFill>
               </a:rPr>
               <a:t>Depiction of Deletion Process</a:t>
+            </a:r>
+          </a:p>
+          <a:p>
+            <a:endParaRPr lang="en-US" dirty="0"/>
+          </a:p>
+        </p:txBody>
+      </p:sp>
+      <p:pic>
+        <p:nvPicPr>
+          <p:cNvPr id="39" name="Picture 38" descr="forgettingCounts.pdf"/>
+          <p:cNvPicPr>
+            <a:picLocks noChangeAspect="1"/>
+          </p:cNvPicPr>
+          <p:nvPr/>
+        </p:nvPicPr>
+        <mc:AlternateContent>
+          <mc:Choice xmlns:ma="http://schemas.microsoft.com/office/mac/drawingml/2008/main" Requires="ma">
+            <p:blipFill>
+              <a:blip r:embed="rId17"/>
+              <a:srcRect l="7059" t="67273" r="50588" b="25455"/>
+              <a:stretch>
+                <a:fillRect/>
+              </a:stretch>
+            </p:blipFill>
+          </mc:Choice>
+          <mc:Fallback>
+            <p:blipFill>
+              <a:blip r:embed="rId18"/>
+              <a:srcRect l="7059" t="67273" r="50588" b="25455"/>
+              <a:stretch>
+                <a:fillRect/>
+              </a:stretch>
+            </p:blipFill>
+          </mc:Fallback>
+        </mc:AlternateContent>
+        <p:spPr>
+          <a:xfrm>
+            <a:off x="30760194" y="3789397"/>
+            <a:ext cx="10629939" cy="2362650"/>
+          </a:xfrm>
+          <a:prstGeom prst="rect">
+            <a:avLst/>
+          </a:prstGeom>
+          <a:solidFill>
+            <a:schemeClr val="bg1"/>
+          </a:solidFill>
+        </p:spPr>
+      </p:pic>
+      <p:sp>
+        <p:nvSpPr>
+          <p:cNvPr id="40" name="TextBox 39"/>
+          <p:cNvSpPr txBox="1"/>
+          <p:nvPr/>
+        </p:nvSpPr>
+        <p:spPr>
+          <a:xfrm>
+            <a:off x="30760194" y="3081511"/>
+            <a:ext cx="10629939" cy="707886"/>
+          </a:xfrm>
+          <a:prstGeom prst="rect">
+            <a:avLst/>
+          </a:prstGeom>
+          <a:solidFill>
+            <a:schemeClr val="tx2"/>
+          </a:solidFill>
+          <a:ln>
+            <a:solidFill>
+              <a:schemeClr val="tx1"/>
+            </a:solidFill>
+          </a:ln>
+        </p:spPr>
+        <p:txBody>
+          <a:bodyPr wrap="square" rtlCol="0">
+            <a:spAutoFit/>
+          </a:bodyPr>
+          <a:lstStyle/>
+          <a:p>
+            <a:r>
+              <a:rPr lang="en-US" sz="4000" dirty="0" smtClean="0">
+                <a:solidFill>
+                  <a:srgbClr val="FFFF00"/>
+                </a:solidFill>
+              </a:rPr>
+              <a:t>Dependent HPYP Sequence Model</a:t>
             </a:r>
           </a:p>
           <a:p>

</xml_diff>